<commit_message>
Added charts to expl. analysis section of slides
</commit_message>
<xml_diff>
--- a/write-ups/presentation.pptx
+++ b/write-ups/presentation.pptx
@@ -16,7 +16,7 @@
     <p:sldId id="260" r:id="rId7"/>
     <p:sldId id="261" r:id="rId8"/>
     <p:sldId id="267" r:id="rId9"/>
-    <p:sldId id="268" r:id="rId10"/>
+    <p:sldId id="269" r:id="rId10"/>
     <p:sldId id="262" r:id="rId11"/>
     <p:sldId id="263" r:id="rId12"/>
     <p:sldId id="264" r:id="rId13"/>
@@ -209,7 +209,7 @@
           <a:p>
             <a:fld id="{BD82AF91-E7F2-4A39-BC23-24C00B262936}" type="datetimeFigureOut">
               <a:rPr lang="en-US" smtClean="0"/>
-              <a:t>12/5/2023</a:t>
+              <a:t>12/7/2023</a:t>
             </a:fld>
             <a:endParaRPr lang="en-US"/>
           </a:p>
@@ -1167,7 +1167,7 @@
           <a:p>
             <a:fld id="{BE7F38CD-72C9-4398-A24D-7646E8955F77}" type="datetimeFigureOut">
               <a:rPr lang="en-US" smtClean="0"/>
-              <a:t>12/5/2023</a:t>
+              <a:t>12/7/2023</a:t>
             </a:fld>
             <a:endParaRPr lang="en-US"/>
           </a:p>
@@ -1465,7 +1465,7 @@
           <a:p>
             <a:fld id="{BE7F38CD-72C9-4398-A24D-7646E8955F77}" type="datetimeFigureOut">
               <a:rPr lang="en-US" smtClean="0"/>
-              <a:t>12/5/2023</a:t>
+              <a:t>12/7/2023</a:t>
             </a:fld>
             <a:endParaRPr lang="en-US"/>
           </a:p>
@@ -1657,7 +1657,7 @@
           <a:p>
             <a:fld id="{BE7F38CD-72C9-4398-A24D-7646E8955F77}" type="datetimeFigureOut">
               <a:rPr lang="en-US" smtClean="0"/>
-              <a:t>12/5/2023</a:t>
+              <a:t>12/7/2023</a:t>
             </a:fld>
             <a:endParaRPr lang="en-US"/>
           </a:p>
@@ -1918,7 +1918,7 @@
           <a:p>
             <a:fld id="{BE7F38CD-72C9-4398-A24D-7646E8955F77}" type="datetimeFigureOut">
               <a:rPr lang="en-US" smtClean="0"/>
-              <a:t>12/5/2023</a:t>
+              <a:t>12/7/2023</a:t>
             </a:fld>
             <a:endParaRPr lang="en-US"/>
           </a:p>
@@ -2342,7 +2342,7 @@
           <a:p>
             <a:fld id="{BE7F38CD-72C9-4398-A24D-7646E8955F77}" type="datetimeFigureOut">
               <a:rPr lang="en-US" smtClean="0"/>
-              <a:t>12/5/2023</a:t>
+              <a:t>12/7/2023</a:t>
             </a:fld>
             <a:endParaRPr lang="en-US"/>
           </a:p>
@@ -2879,7 +2879,7 @@
           <a:p>
             <a:fld id="{BE7F38CD-72C9-4398-A24D-7646E8955F77}" type="datetimeFigureOut">
               <a:rPr lang="en-US" smtClean="0"/>
-              <a:t>12/5/2023</a:t>
+              <a:t>12/7/2023</a:t>
             </a:fld>
             <a:endParaRPr lang="en-US"/>
           </a:p>
@@ -3743,7 +3743,7 @@
           <a:p>
             <a:fld id="{BE7F38CD-72C9-4398-A24D-7646E8955F77}" type="datetimeFigureOut">
               <a:rPr lang="en-US" smtClean="0"/>
-              <a:t>12/5/2023</a:t>
+              <a:t>12/7/2023</a:t>
             </a:fld>
             <a:endParaRPr lang="en-US"/>
           </a:p>
@@ -3913,7 +3913,7 @@
           <a:p>
             <a:fld id="{BE7F38CD-72C9-4398-A24D-7646E8955F77}" type="datetimeFigureOut">
               <a:rPr lang="en-US" smtClean="0"/>
-              <a:t>12/5/2023</a:t>
+              <a:t>12/7/2023</a:t>
             </a:fld>
             <a:endParaRPr lang="en-US"/>
           </a:p>
@@ -4097,7 +4097,7 @@
           <a:p>
             <a:fld id="{BE7F38CD-72C9-4398-A24D-7646E8955F77}" type="datetimeFigureOut">
               <a:rPr lang="en-US" smtClean="0"/>
-              <a:t>12/5/2023</a:t>
+              <a:t>12/7/2023</a:t>
             </a:fld>
             <a:endParaRPr lang="en-US"/>
           </a:p>
@@ -4267,7 +4267,7 @@
           <a:p>
             <a:fld id="{BE7F38CD-72C9-4398-A24D-7646E8955F77}" type="datetimeFigureOut">
               <a:rPr lang="en-US" smtClean="0"/>
-              <a:t>12/5/2023</a:t>
+              <a:t>12/7/2023</a:t>
             </a:fld>
             <a:endParaRPr lang="en-US"/>
           </a:p>
@@ -4511,7 +4511,7 @@
           <a:p>
             <a:fld id="{BE7F38CD-72C9-4398-A24D-7646E8955F77}" type="datetimeFigureOut">
               <a:rPr lang="en-US" smtClean="0"/>
-              <a:t>12/5/2023</a:t>
+              <a:t>12/7/2023</a:t>
             </a:fld>
             <a:endParaRPr lang="en-US"/>
           </a:p>
@@ -4747,7 +4747,7 @@
           <a:p>
             <a:fld id="{BE7F38CD-72C9-4398-A24D-7646E8955F77}" type="datetimeFigureOut">
               <a:rPr lang="en-US" smtClean="0"/>
-              <a:t>12/5/2023</a:t>
+              <a:t>12/7/2023</a:t>
             </a:fld>
             <a:endParaRPr lang="en-US"/>
           </a:p>
@@ -5213,7 +5213,7 @@
           <a:p>
             <a:fld id="{BE7F38CD-72C9-4398-A24D-7646E8955F77}" type="datetimeFigureOut">
               <a:rPr lang="en-US" smtClean="0"/>
-              <a:t>12/5/2023</a:t>
+              <a:t>12/7/2023</a:t>
             </a:fld>
             <a:endParaRPr lang="en-US"/>
           </a:p>
@@ -5331,7 +5331,7 @@
           <a:p>
             <a:fld id="{BE7F38CD-72C9-4398-A24D-7646E8955F77}" type="datetimeFigureOut">
               <a:rPr lang="en-US" smtClean="0"/>
-              <a:t>12/5/2023</a:t>
+              <a:t>12/7/2023</a:t>
             </a:fld>
             <a:endParaRPr lang="en-US"/>
           </a:p>
@@ -5426,7 +5426,7 @@
           <a:p>
             <a:fld id="{BE7F38CD-72C9-4398-A24D-7646E8955F77}" type="datetimeFigureOut">
               <a:rPr lang="en-US" smtClean="0"/>
-              <a:t>12/5/2023</a:t>
+              <a:t>12/7/2023</a:t>
             </a:fld>
             <a:endParaRPr lang="en-US"/>
           </a:p>
@@ -5681,7 +5681,7 @@
           <a:p>
             <a:fld id="{BE7F38CD-72C9-4398-A24D-7646E8955F77}" type="datetimeFigureOut">
               <a:rPr lang="en-US" smtClean="0"/>
-              <a:t>12/5/2023</a:t>
+              <a:t>12/7/2023</a:t>
             </a:fld>
             <a:endParaRPr lang="en-US"/>
           </a:p>
@@ -5981,7 +5981,7 @@
           <a:p>
             <a:fld id="{BE7F38CD-72C9-4398-A24D-7646E8955F77}" type="datetimeFigureOut">
               <a:rPr lang="en-US" smtClean="0"/>
-              <a:t>12/5/2023</a:t>
+              <a:t>12/7/2023</a:t>
             </a:fld>
             <a:endParaRPr lang="en-US"/>
           </a:p>
@@ -6215,7 +6215,7 @@
           <a:p>
             <a:fld id="{BE7F38CD-72C9-4398-A24D-7646E8955F77}" type="datetimeFigureOut">
               <a:rPr lang="en-US" smtClean="0"/>
-              <a:t>12/5/2023</a:t>
+              <a:t>12/7/2023</a:t>
             </a:fld>
             <a:endParaRPr lang="en-US"/>
           </a:p>
@@ -9590,9 +9590,16 @@
             <p:ph type="title"/>
           </p:nvPr>
         </p:nvSpPr>
-        <p:spPr/>
-        <p:txBody>
-          <a:bodyPr/>
+        <p:spPr>
+          <a:xfrm>
+            <a:off x="913795" y="609600"/>
+            <a:ext cx="5116286" cy="970450"/>
+          </a:xfrm>
+        </p:spPr>
+        <p:txBody>
+          <a:bodyPr>
+            <a:normAutofit fontScale="90000"/>
+          </a:bodyPr>
           <a:lstStyle/>
           <a:p>
             <a:r>
@@ -9618,15 +9625,76 @@
             <p:ph idx="1"/>
           </p:nvPr>
         </p:nvSpPr>
-        <p:spPr/>
-        <p:txBody>
-          <a:bodyPr/>
+        <p:spPr>
+          <a:xfrm>
+            <a:off x="913795" y="1732449"/>
+            <a:ext cx="4681462" cy="4515951"/>
+          </a:xfrm>
+        </p:spPr>
+        <p:txBody>
+          <a:bodyPr>
+            <a:normAutofit/>
+          </a:bodyPr>
           <a:lstStyle/>
           <a:p>
-            <a:endParaRPr lang="en-US"/>
-          </a:p>
-        </p:txBody>
-      </p:sp>
+            <a:r>
+              <a:rPr lang="en-US" dirty="0"/>
+              <a:t>Out of demographic information, only gender showed clear patterns</a:t>
+            </a:r>
+          </a:p>
+          <a:p>
+            <a:pPr lvl="1"/>
+            <a:r>
+              <a:rPr lang="en-US" dirty="0"/>
+              <a:t>Respondents identifying as women more likely than men to rate enjoyment of chess as 1 or 2</a:t>
+            </a:r>
+          </a:p>
+          <a:p>
+            <a:pPr lvl="1"/>
+            <a:r>
+              <a:rPr lang="en-US" dirty="0"/>
+              <a:t>Respondents identifying as women more significantly more likely than men to select puzzle, party, memory, and luck-based as enjoyed genres</a:t>
+            </a:r>
+          </a:p>
+          <a:p>
+            <a:pPr lvl="1"/>
+            <a:r>
+              <a:rPr lang="en-US" dirty="0"/>
+              <a:t>Respondents identifying as male were significantly more likely than women to select science fiction and World War II as enjoyed genres</a:t>
+            </a:r>
+          </a:p>
+        </p:txBody>
+      </p:sp>
+      <p:pic>
+        <p:nvPicPr>
+          <p:cNvPr id="4" name="Picture 3" descr="A graph with blue and orange lines&#10;&#10;Description automatically generated">
+            <a:extLst>
+              <a:ext uri="{FF2B5EF4-FFF2-40B4-BE49-F238E27FC236}">
+                <a16:creationId xmlns:a16="http://schemas.microsoft.com/office/drawing/2014/main" id="{C453A0F1-5051-5B39-F6CF-FE93701AB6EA}"/>
+              </a:ext>
+            </a:extLst>
+          </p:cNvPr>
+          <p:cNvPicPr>
+            <a:picLocks noChangeAspect="1"/>
+          </p:cNvPicPr>
+          <p:nvPr/>
+        </p:nvPicPr>
+        <p:blipFill>
+          <a:blip r:embed="rId2"/>
+          <a:stretch>
+            <a:fillRect/>
+          </a:stretch>
+        </p:blipFill>
+        <p:spPr>
+          <a:xfrm>
+            <a:off x="6291942" y="916499"/>
+            <a:ext cx="5116286" cy="5025002"/>
+          </a:xfrm>
+          <a:prstGeom prst="rect">
+            <a:avLst/>
+          </a:prstGeom>
+        </p:spPr>
+      </p:pic>
     </p:spTree>
     <p:extLst>
       <p:ext uri="{BB962C8B-B14F-4D97-AF65-F5344CB8AC3E}">
@@ -9662,7 +9730,7 @@
           <p:cNvPr id="2" name="Title 1">
             <a:extLst>
               <a:ext uri="{FF2B5EF4-FFF2-40B4-BE49-F238E27FC236}">
-                <a16:creationId xmlns:a16="http://schemas.microsoft.com/office/drawing/2014/main" id="{3766D2DA-9541-0022-30F6-736821CCA193}"/>
+                <a16:creationId xmlns:a16="http://schemas.microsoft.com/office/drawing/2014/main" id="{0F2AA240-A71D-2E4E-AAA8-B93FFFBDC08A}"/>
               </a:ext>
             </a:extLst>
           </p:cNvPr>
@@ -9673,11 +9741,19 @@
             <p:ph type="title"/>
           </p:nvPr>
         </p:nvSpPr>
-        <p:spPr/>
-        <p:txBody>
-          <a:bodyPr/>
+        <p:spPr>
+          <a:xfrm>
+            <a:off x="119137" y="83843"/>
+            <a:ext cx="6292549" cy="1661111"/>
+          </a:xfrm>
+        </p:spPr>
+        <p:txBody>
+          <a:bodyPr>
+            <a:normAutofit/>
+          </a:bodyPr>
           <a:lstStyle/>
           <a:p>
+            <a:pPr algn="l"/>
             <a:r>
               <a:rPr lang="en-US" dirty="0"/>
               <a:t>Exploratory Analysis: Clustering</a:t>
@@ -9690,7 +9766,7 @@
           <p:cNvPr id="3" name="Content Placeholder 2">
             <a:extLst>
               <a:ext uri="{FF2B5EF4-FFF2-40B4-BE49-F238E27FC236}">
-                <a16:creationId xmlns:a16="http://schemas.microsoft.com/office/drawing/2014/main" id="{593CE243-1019-2AA9-D5BD-8528586A4050}"/>
+                <a16:creationId xmlns:a16="http://schemas.microsoft.com/office/drawing/2014/main" id="{1CA7C232-EF36-84EB-F250-FCF9DB871151}"/>
               </a:ext>
             </a:extLst>
           </p:cNvPr>
@@ -9701,19 +9777,197 @@
             <p:ph idx="1"/>
           </p:nvPr>
         </p:nvSpPr>
-        <p:spPr/>
-        <p:txBody>
-          <a:bodyPr/>
+        <p:spPr>
+          <a:xfrm>
+            <a:off x="119138" y="1744955"/>
+            <a:ext cx="4877405" cy="4058751"/>
+          </a:xfrm>
+        </p:spPr>
+        <p:txBody>
+          <a:bodyPr>
+            <a:normAutofit fontScale="92500" lnSpcReduction="10000"/>
+          </a:bodyPr>
           <a:lstStyle/>
           <a:p>
-            <a:endParaRPr lang="en-US"/>
-          </a:p>
-        </p:txBody>
-      </p:sp>
+            <a:r>
+              <a:rPr lang="en-US" dirty="0"/>
+              <a:t>Clustering showed clear patterns for two distinct groups of people</a:t>
+            </a:r>
+          </a:p>
+          <a:p>
+            <a:pPr lvl="1"/>
+            <a:r>
+              <a:rPr lang="en-US" dirty="0"/>
+              <a:t>Casual/non-gamers and more involved gamers</a:t>
+            </a:r>
+          </a:p>
+          <a:p>
+            <a:r>
+              <a:rPr lang="en-US" dirty="0"/>
+              <a:t>Compared to the casual group, the involved gamers:</a:t>
+            </a:r>
+          </a:p>
+          <a:p>
+            <a:pPr lvl="1"/>
+            <a:r>
+              <a:rPr lang="en-US" dirty="0"/>
+              <a:t>Owned more board games</a:t>
+            </a:r>
+          </a:p>
+          <a:p>
+            <a:pPr lvl="1"/>
+            <a:r>
+              <a:rPr lang="en-US" dirty="0"/>
+              <a:t>Were more willing to play different types of games depending on the situation</a:t>
+            </a:r>
+          </a:p>
+          <a:p>
+            <a:pPr lvl="1"/>
+            <a:r>
+              <a:rPr lang="en-US" dirty="0"/>
+              <a:t>Were more likely enjoy any given category of genre and gameplay element</a:t>
+            </a:r>
+          </a:p>
+          <a:p>
+            <a:pPr lvl="1"/>
+            <a:r>
+              <a:rPr lang="en-US" dirty="0"/>
+              <a:t>Suggests a broader range of tastes than the more casual group</a:t>
+            </a:r>
+          </a:p>
+        </p:txBody>
+      </p:sp>
+      <p:pic>
+        <p:nvPicPr>
+          <p:cNvPr id="8" name="Picture 7" descr="A graph of a bar chart&#10;&#10;Description automatically generated">
+            <a:extLst>
+              <a:ext uri="{FF2B5EF4-FFF2-40B4-BE49-F238E27FC236}">
+                <a16:creationId xmlns:a16="http://schemas.microsoft.com/office/drawing/2014/main" id="{D8EB1D11-84A8-36DA-D233-FCFE46D8F3CD}"/>
+              </a:ext>
+            </a:extLst>
+          </p:cNvPr>
+          <p:cNvPicPr>
+            <a:picLocks noChangeAspect="1"/>
+          </p:cNvPicPr>
+          <p:nvPr/>
+        </p:nvPicPr>
+        <p:blipFill>
+          <a:blip r:embed="rId2"/>
+          <a:stretch>
+            <a:fillRect/>
+          </a:stretch>
+        </p:blipFill>
+        <p:spPr>
+          <a:xfrm>
+            <a:off x="4930415" y="-30493"/>
+            <a:ext cx="3940234" cy="3459493"/>
+          </a:xfrm>
+          <a:prstGeom prst="rect">
+            <a:avLst/>
+          </a:prstGeom>
+        </p:spPr>
+      </p:pic>
+      <p:pic>
+        <p:nvPicPr>
+          <p:cNvPr id="9" name="Picture 8" descr="A graph of blue and orange bars&#10;&#10;Description automatically generated">
+            <a:extLst>
+              <a:ext uri="{FF2B5EF4-FFF2-40B4-BE49-F238E27FC236}">
+                <a16:creationId xmlns:a16="http://schemas.microsoft.com/office/drawing/2014/main" id="{0C197D14-66EC-75B5-7497-A93EA8827855}"/>
+              </a:ext>
+            </a:extLst>
+          </p:cNvPr>
+          <p:cNvPicPr>
+            <a:picLocks noChangeAspect="1"/>
+          </p:cNvPicPr>
+          <p:nvPr/>
+        </p:nvPicPr>
+        <p:blipFill>
+          <a:blip r:embed="rId3"/>
+          <a:stretch>
+            <a:fillRect/>
+          </a:stretch>
+        </p:blipFill>
+        <p:spPr>
+          <a:xfrm>
+            <a:off x="8728360" y="0"/>
+            <a:ext cx="3463640" cy="3456979"/>
+          </a:xfrm>
+          <a:prstGeom prst="rect">
+            <a:avLst/>
+          </a:prstGeom>
+        </p:spPr>
+      </p:pic>
+      <p:pic>
+        <p:nvPicPr>
+          <p:cNvPr id="10" name="Content Placeholder 4" descr="A graph with different colored bars&#10;&#10;Description automatically generated">
+            <a:extLst>
+              <a:ext uri="{FF2B5EF4-FFF2-40B4-BE49-F238E27FC236}">
+                <a16:creationId xmlns:a16="http://schemas.microsoft.com/office/drawing/2014/main" id="{4DDACEF2-E1C5-D4D7-12DD-B44724692B02}"/>
+              </a:ext>
+            </a:extLst>
+          </p:cNvPr>
+          <p:cNvPicPr>
+            <a:picLocks noChangeAspect="1"/>
+          </p:cNvPicPr>
+          <p:nvPr/>
+        </p:nvPicPr>
+        <p:blipFill>
+          <a:blip r:embed="rId4"/>
+          <a:stretch>
+            <a:fillRect/>
+          </a:stretch>
+        </p:blipFill>
+        <p:spPr>
+          <a:xfrm>
+            <a:off x="4930415" y="3428997"/>
+            <a:ext cx="3797943" cy="3429000"/>
+          </a:xfrm>
+          <a:prstGeom prst="rect">
+            <a:avLst/>
+          </a:prstGeom>
+          <a:effectLst>
+            <a:outerShdw blurRad="25400" dir="17880000">
+              <a:srgbClr val="000000">
+                <a:alpha val="46000"/>
+              </a:srgbClr>
+            </a:outerShdw>
+          </a:effectLst>
+        </p:spPr>
+      </p:pic>
+      <p:pic>
+        <p:nvPicPr>
+          <p:cNvPr id="11" name="Picture 10" descr="A graph of different colored lines&#10;&#10;Description automatically generated with medium confidence">
+            <a:extLst>
+              <a:ext uri="{FF2B5EF4-FFF2-40B4-BE49-F238E27FC236}">
+                <a16:creationId xmlns:a16="http://schemas.microsoft.com/office/drawing/2014/main" id="{44F83DDB-64C5-56F2-3E9F-F697D2D9151D}"/>
+              </a:ext>
+            </a:extLst>
+          </p:cNvPr>
+          <p:cNvPicPr>
+            <a:picLocks noChangeAspect="1"/>
+          </p:cNvPicPr>
+          <p:nvPr/>
+        </p:nvPicPr>
+        <p:blipFill>
+          <a:blip r:embed="rId5"/>
+          <a:stretch>
+            <a:fillRect/>
+          </a:stretch>
+        </p:blipFill>
+        <p:spPr>
+          <a:xfrm>
+            <a:off x="8728359" y="3456567"/>
+            <a:ext cx="3463641" cy="3401843"/>
+          </a:xfrm>
+          <a:prstGeom prst="rect">
+            <a:avLst/>
+          </a:prstGeom>
+        </p:spPr>
+      </p:pic>
     </p:spTree>
     <p:extLst>
       <p:ext uri="{BB962C8B-B14F-4D97-AF65-F5344CB8AC3E}">
-        <p14:creationId xmlns:p14="http://schemas.microsoft.com/office/powerpoint/2010/main" val="3525398260"/>
+        <p14:creationId xmlns:p14="http://schemas.microsoft.com/office/powerpoint/2010/main" val="3753848281"/>
       </p:ext>
     </p:extLst>
   </p:cSld>

</xml_diff>

<commit_message>
updated presentation, nearly complete
</commit_message>
<xml_diff>
--- a/write-ups/presentation.pptx
+++ b/write-ups/presentation.pptx
@@ -5,7 +5,7 @@
     <p:sldMasterId id="2147483660" r:id="rId1"/>
   </p:sldMasterIdLst>
   <p:notesMasterIdLst>
-    <p:notesMasterId r:id="rId19"/>
+    <p:notesMasterId r:id="rId17"/>
   </p:notesMasterIdLst>
   <p:sldIdLst>
     <p:sldId id="256" r:id="rId2"/>
@@ -16,15 +16,13 @@
     <p:sldId id="261" r:id="rId7"/>
     <p:sldId id="267" r:id="rId8"/>
     <p:sldId id="275" r:id="rId9"/>
-    <p:sldId id="272" r:id="rId10"/>
-    <p:sldId id="273" r:id="rId11"/>
-    <p:sldId id="274" r:id="rId12"/>
-    <p:sldId id="268" r:id="rId13"/>
-    <p:sldId id="269" r:id="rId14"/>
-    <p:sldId id="262" r:id="rId15"/>
-    <p:sldId id="263" r:id="rId16"/>
-    <p:sldId id="264" r:id="rId17"/>
-    <p:sldId id="266" r:id="rId18"/>
+    <p:sldId id="274" r:id="rId10"/>
+    <p:sldId id="268" r:id="rId11"/>
+    <p:sldId id="269" r:id="rId12"/>
+    <p:sldId id="262" r:id="rId13"/>
+    <p:sldId id="263" r:id="rId14"/>
+    <p:sldId id="264" r:id="rId15"/>
+    <p:sldId id="266" r:id="rId16"/>
   </p:sldIdLst>
   <p:sldSz cx="12192000" cy="6858000"/>
   <p:notesSz cx="6858000" cy="9144000"/>
@@ -935,7 +933,7 @@
           <a:p>
             <a:fld id="{8793C440-CB3B-49CE-807A-74AE90D71E23}" type="slidenum">
               <a:rPr lang="en-US" smtClean="0"/>
-              <a:t>13</a:t>
+              <a:t>11</a:t>
             </a:fld>
             <a:endParaRPr lang="en-US"/>
           </a:p>
@@ -7162,7 +7160,7 @@
           <p:cNvPr id="2" name="Title 1">
             <a:extLst>
               <a:ext uri="{FF2B5EF4-FFF2-40B4-BE49-F238E27FC236}">
-                <a16:creationId xmlns:a16="http://schemas.microsoft.com/office/drawing/2014/main" id="{56BE8B42-884F-A127-F785-060B2432FACC}"/>
+                <a16:creationId xmlns:a16="http://schemas.microsoft.com/office/drawing/2014/main" id="{3766D2DA-9541-0022-30F6-736821CCA193}"/>
               </a:ext>
             </a:extLst>
           </p:cNvPr>
@@ -7176,28 +7174,28 @@
         <p:spPr>
           <a:xfrm>
             <a:off x="913795" y="609600"/>
-            <a:ext cx="4388360" cy="970450"/>
+            <a:ext cx="3121492" cy="993913"/>
           </a:xfrm>
         </p:spPr>
         <p:txBody>
-          <a:bodyPr>
-            <a:normAutofit/>
-          </a:bodyPr>
+          <a:bodyPr/>
           <a:lstStyle/>
           <a:p>
             <a:r>
-              <a:rPr lang="en-US" dirty="0"/>
-              <a:t>Discoveries (4/5)</a:t>
-            </a:r>
-          </a:p>
-        </p:txBody>
-      </p:sp>
-      <p:sp>
-        <p:nvSpPr>
-          <p:cNvPr id="4" name="TextBox 3">
+              <a:rPr lang="en-US" dirty="0">
+                <a:effectLst/>
+              </a:rPr>
+              <a:t>Clustering</a:t>
+            </a:r>
+          </a:p>
+        </p:txBody>
+      </p:sp>
+      <p:sp>
+        <p:nvSpPr>
+          <p:cNvPr id="6" name="TextBox 5">
             <a:extLst>
               <a:ext uri="{FF2B5EF4-FFF2-40B4-BE49-F238E27FC236}">
-                <a16:creationId xmlns:a16="http://schemas.microsoft.com/office/drawing/2014/main" id="{647C5E28-73D9-622E-04E3-CD82DD686780}"/>
+                <a16:creationId xmlns:a16="http://schemas.microsoft.com/office/drawing/2014/main" id="{0153244A-F660-589B-3C37-C6CFA318B3CF}"/>
               </a:ext>
             </a:extLst>
           </p:cNvPr>
@@ -7228,208 +7226,6 @@
           </a:p>
         </p:txBody>
       </p:sp>
-    </p:spTree>
-    <p:extLst>
-      <p:ext uri="{BB962C8B-B14F-4D97-AF65-F5344CB8AC3E}">
-        <p14:creationId xmlns:p14="http://schemas.microsoft.com/office/powerpoint/2010/main" val="134045528"/>
-      </p:ext>
-    </p:extLst>
-  </p:cSld>
-  <p:clrMapOvr>
-    <a:masterClrMapping/>
-  </p:clrMapOvr>
-</p:sld>
-</file>
-
-<file path=ppt/slides/slide11.xml><?xml version="1.0" encoding="utf-8"?>
-<p:sld xmlns:a="http://schemas.openxmlformats.org/drawingml/2006/main" xmlns:r="http://schemas.openxmlformats.org/officeDocument/2006/relationships" xmlns:p="http://schemas.openxmlformats.org/presentationml/2006/main">
-  <p:cSld>
-    <p:spTree>
-      <p:nvGrpSpPr>
-        <p:cNvPr id="1" name=""/>
-        <p:cNvGrpSpPr/>
-        <p:nvPr/>
-      </p:nvGrpSpPr>
-      <p:grpSpPr>
-        <a:xfrm>
-          <a:off x="0" y="0"/>
-          <a:ext cx="0" cy="0"/>
-          <a:chOff x="0" y="0"/>
-          <a:chExt cx="0" cy="0"/>
-        </a:xfrm>
-      </p:grpSpPr>
-      <p:sp>
-        <p:nvSpPr>
-          <p:cNvPr id="2" name="Title 1">
-            <a:extLst>
-              <a:ext uri="{FF2B5EF4-FFF2-40B4-BE49-F238E27FC236}">
-                <a16:creationId xmlns:a16="http://schemas.microsoft.com/office/drawing/2014/main" id="{56BE8B42-884F-A127-F785-060B2432FACC}"/>
-              </a:ext>
-            </a:extLst>
-          </p:cNvPr>
-          <p:cNvSpPr>
-            <a:spLocks noGrp="1"/>
-          </p:cNvSpPr>
-          <p:nvPr>
-            <p:ph type="title"/>
-          </p:nvPr>
-        </p:nvSpPr>
-        <p:spPr>
-          <a:xfrm>
-            <a:off x="913795" y="609600"/>
-            <a:ext cx="4388360" cy="970450"/>
-          </a:xfrm>
-        </p:spPr>
-        <p:txBody>
-          <a:bodyPr>
-            <a:normAutofit/>
-          </a:bodyPr>
-          <a:lstStyle/>
-          <a:p>
-            <a:r>
-              <a:rPr lang="en-US" dirty="0"/>
-              <a:t>Discoveries (5/5)</a:t>
-            </a:r>
-          </a:p>
-        </p:txBody>
-      </p:sp>
-      <p:sp>
-        <p:nvSpPr>
-          <p:cNvPr id="4" name="TextBox 3">
-            <a:extLst>
-              <a:ext uri="{FF2B5EF4-FFF2-40B4-BE49-F238E27FC236}">
-                <a16:creationId xmlns:a16="http://schemas.microsoft.com/office/drawing/2014/main" id="{647C5E28-73D9-622E-04E3-CD82DD686780}"/>
-              </a:ext>
-            </a:extLst>
-          </p:cNvPr>
-          <p:cNvSpPr txBox="1"/>
-          <p:nvPr/>
-        </p:nvSpPr>
-        <p:spPr>
-          <a:xfrm>
-            <a:off x="913795" y="609600"/>
-            <a:ext cx="2504661" cy="369332"/>
-          </a:xfrm>
-          <a:prstGeom prst="rect">
-            <a:avLst/>
-          </a:prstGeom>
-          <a:noFill/>
-        </p:spPr>
-        <p:txBody>
-          <a:bodyPr wrap="square" rtlCol="0">
-            <a:spAutoFit/>
-          </a:bodyPr>
-          <a:lstStyle/>
-          <a:p>
-            <a:r>
-              <a:rPr lang="en-US" sz="1800" dirty="0"/>
-              <a:t>Exploratory Analysis:</a:t>
-            </a:r>
-            <a:endParaRPr lang="en-US" dirty="0"/>
-          </a:p>
-        </p:txBody>
-      </p:sp>
-    </p:spTree>
-    <p:extLst>
-      <p:ext uri="{BB962C8B-B14F-4D97-AF65-F5344CB8AC3E}">
-        <p14:creationId xmlns:p14="http://schemas.microsoft.com/office/powerpoint/2010/main" val="3160549705"/>
-      </p:ext>
-    </p:extLst>
-  </p:cSld>
-  <p:clrMapOvr>
-    <a:masterClrMapping/>
-  </p:clrMapOvr>
-</p:sld>
-</file>
-
-<file path=ppt/slides/slide12.xml><?xml version="1.0" encoding="utf-8"?>
-<p:sld xmlns:a="http://schemas.openxmlformats.org/drawingml/2006/main" xmlns:r="http://schemas.openxmlformats.org/officeDocument/2006/relationships" xmlns:p="http://schemas.openxmlformats.org/presentationml/2006/main">
-  <p:cSld>
-    <p:spTree>
-      <p:nvGrpSpPr>
-        <p:cNvPr id="1" name=""/>
-        <p:cNvGrpSpPr/>
-        <p:nvPr/>
-      </p:nvGrpSpPr>
-      <p:grpSpPr>
-        <a:xfrm>
-          <a:off x="0" y="0"/>
-          <a:ext cx="0" cy="0"/>
-          <a:chOff x="0" y="0"/>
-          <a:chExt cx="0" cy="0"/>
-        </a:xfrm>
-      </p:grpSpPr>
-      <p:sp>
-        <p:nvSpPr>
-          <p:cNvPr id="2" name="Title 1">
-            <a:extLst>
-              <a:ext uri="{FF2B5EF4-FFF2-40B4-BE49-F238E27FC236}">
-                <a16:creationId xmlns:a16="http://schemas.microsoft.com/office/drawing/2014/main" id="{3766D2DA-9541-0022-30F6-736821CCA193}"/>
-              </a:ext>
-            </a:extLst>
-          </p:cNvPr>
-          <p:cNvSpPr>
-            <a:spLocks noGrp="1"/>
-          </p:cNvSpPr>
-          <p:nvPr>
-            <p:ph type="title"/>
-          </p:nvPr>
-        </p:nvSpPr>
-        <p:spPr>
-          <a:xfrm>
-            <a:off x="913795" y="609600"/>
-            <a:ext cx="3121492" cy="993913"/>
-          </a:xfrm>
-        </p:spPr>
-        <p:txBody>
-          <a:bodyPr/>
-          <a:lstStyle/>
-          <a:p>
-            <a:r>
-              <a:rPr lang="en-US" dirty="0">
-                <a:effectLst/>
-              </a:rPr>
-              <a:t>Clustering</a:t>
-            </a:r>
-          </a:p>
-        </p:txBody>
-      </p:sp>
-      <p:sp>
-        <p:nvSpPr>
-          <p:cNvPr id="6" name="TextBox 5">
-            <a:extLst>
-              <a:ext uri="{FF2B5EF4-FFF2-40B4-BE49-F238E27FC236}">
-                <a16:creationId xmlns:a16="http://schemas.microsoft.com/office/drawing/2014/main" id="{0153244A-F660-589B-3C37-C6CFA318B3CF}"/>
-              </a:ext>
-            </a:extLst>
-          </p:cNvPr>
-          <p:cNvSpPr txBox="1"/>
-          <p:nvPr/>
-        </p:nvSpPr>
-        <p:spPr>
-          <a:xfrm>
-            <a:off x="913795" y="609600"/>
-            <a:ext cx="2504661" cy="369332"/>
-          </a:xfrm>
-          <a:prstGeom prst="rect">
-            <a:avLst/>
-          </a:prstGeom>
-          <a:noFill/>
-        </p:spPr>
-        <p:txBody>
-          <a:bodyPr wrap="square" rtlCol="0">
-            <a:spAutoFit/>
-          </a:bodyPr>
-          <a:lstStyle/>
-          <a:p>
-            <a:r>
-              <a:rPr lang="en-US" sz="1800" dirty="0"/>
-              <a:t>Exploratory Analysis:</a:t>
-            </a:r>
-            <a:endParaRPr lang="en-US" dirty="0"/>
-          </a:p>
-        </p:txBody>
-      </p:sp>
       <p:sp>
         <p:nvSpPr>
           <p:cNvPr id="12" name="Content Placeholder 11">
@@ -7448,12 +7244,14 @@
         </p:nvSpPr>
         <p:spPr>
           <a:xfrm>
-            <a:off x="913795" y="1732449"/>
-            <a:ext cx="4299650" cy="4058751"/>
+            <a:off x="913794" y="1732449"/>
+            <a:ext cx="6235753" cy="4615342"/>
           </a:xfrm>
         </p:spPr>
         <p:txBody>
-          <a:bodyPr/>
+          <a:bodyPr>
+            <a:normAutofit fontScale="85000" lnSpcReduction="10000"/>
+          </a:bodyPr>
           <a:lstStyle/>
           <a:p>
             <a:r>
@@ -7464,7 +7262,7 @@
           <a:p>
             <a:r>
               <a:rPr lang="en-US" dirty="0"/>
-              <a:t>Highest Silhouette was 0.119 with 2 clusters</a:t>
+              <a:t>Showed Clear Patterns for Two Distinct Groups of People</a:t>
             </a:r>
           </a:p>
           <a:p>
@@ -7490,16 +7288,51 @@
           <a:p>
             <a:r>
               <a:rPr lang="en-US" dirty="0"/>
-              <a:t>Plotting Data Against the Cluster Assignment reveals the Emergent Label “</a:t>
-            </a:r>
-            <a:r>
-              <a:rPr lang="en-US" dirty="0" err="1"/>
-              <a:t>IsEnthusiast</a:t>
-            </a:r>
+              <a:t>Emergent Label “Enthusiast”</a:t>
+            </a:r>
+          </a:p>
+          <a:p>
             <a:r>
               <a:rPr lang="en-US" dirty="0"/>
-              <a:t>”</a:t>
-            </a:r>
+              <a:t>Compared to the Non-Enthusiast group, the Involved Gamers:</a:t>
+            </a:r>
+          </a:p>
+          <a:p>
+            <a:pPr lvl="1"/>
+            <a:r>
+              <a:rPr lang="en-US" dirty="0"/>
+              <a:t>Own more board games</a:t>
+            </a:r>
+          </a:p>
+          <a:p>
+            <a:pPr lvl="1"/>
+            <a:r>
+              <a:rPr lang="en-US" dirty="0"/>
+              <a:t>Are more willing to play different types of games depending on the situation</a:t>
+            </a:r>
+          </a:p>
+          <a:p>
+            <a:pPr lvl="1"/>
+            <a:r>
+              <a:rPr lang="en-US" dirty="0"/>
+              <a:t>Are more likely enjoy any given category of genre and gameplay element</a:t>
+            </a:r>
+          </a:p>
+          <a:p>
+            <a:pPr lvl="1"/>
+            <a:r>
+              <a:rPr lang="en-US" dirty="0"/>
+              <a:t>Suggests a broader range of tastes than the more casual group</a:t>
+            </a:r>
+          </a:p>
+          <a:p>
+            <a:r>
+              <a:rPr lang="en-US" dirty="0"/>
+              <a:t>The Enthusiast Clustering is indifferent to ones gender</a:t>
+            </a:r>
+          </a:p>
+          <a:p>
+            <a:endParaRPr lang="en-US" dirty="0"/>
           </a:p>
         </p:txBody>
       </p:sp>
@@ -7525,7 +7358,7 @@
         </p:blipFill>
         <p:spPr>
           <a:xfrm>
-            <a:off x="6686567" y="0"/>
+            <a:off x="8184063" y="0"/>
             <a:ext cx="4007937" cy="3498992"/>
           </a:xfrm>
           <a:prstGeom prst="rect">
@@ -7555,7 +7388,7 @@
         </p:blipFill>
         <p:spPr>
           <a:xfrm>
-            <a:off x="6686567" y="3498992"/>
+            <a:off x="8184062" y="3515160"/>
             <a:ext cx="4007938" cy="3342840"/>
           </a:xfrm>
           <a:prstGeom prst="rect">
@@ -7563,433 +7396,6 @@
           </a:prstGeom>
         </p:spPr>
       </p:pic>
-      <p:sp>
-        <p:nvSpPr>
-          <p:cNvPr id="3" name="Content Placeholder 2">
-            <a:extLst>
-              <a:ext uri="{FF2B5EF4-FFF2-40B4-BE49-F238E27FC236}">
-                <a16:creationId xmlns:a16="http://schemas.microsoft.com/office/drawing/2014/main" id="{1CA7C232-EF36-84EB-F250-FCF9DB871151}"/>
-              </a:ext>
-            </a:extLst>
-          </p:cNvPr>
-          <p:cNvSpPr>
-            <a:spLocks noGrp="1"/>
-          </p:cNvSpPr>
-          <p:nvPr/>
-        </p:nvSpPr>
-        <p:spPr>
-          <a:xfrm>
-            <a:off x="1934515" y="2783081"/>
-            <a:ext cx="4877405" cy="4058751"/>
-          </a:xfrm>
-          <a:prstGeom prst="rect">
-            <a:avLst/>
-          </a:prstGeom>
-          <a:effectLst>
-            <a:outerShdw blurRad="25400" dir="17880000">
-              <a:srgbClr val="000000">
-                <a:alpha val="46000"/>
-              </a:srgbClr>
-            </a:outerShdw>
-          </a:effectLst>
-        </p:spPr>
-        <p:txBody>
-          <a:bodyPr vert="horz" lIns="91440" tIns="45720" rIns="91440" bIns="45720" rtlCol="0" anchor="t">
-            <a:normAutofit fontScale="92500" lnSpcReduction="10000"/>
-          </a:bodyPr>
-          <a:lstStyle>
-            <a:lvl1pPr marL="342900" indent="-306000" algn="l" defTabSz="457200" rtl="0" eaLnBrk="1" latinLnBrk="0" hangingPunct="1">
-              <a:spcBef>
-                <a:spcPct val="20000"/>
-              </a:spcBef>
-              <a:spcAft>
-                <a:spcPts val="600"/>
-              </a:spcAft>
-              <a:buClr>
-                <a:schemeClr val="tx2"/>
-              </a:buClr>
-              <a:buSzPct val="70000"/>
-              <a:buFont typeface="Wingdings 2" charset="2"/>
-              <a:buChar char=""/>
-              <a:defRPr sz="2000" kern="1200">
-                <a:ln>
-                  <a:solidFill>
-                    <a:schemeClr val="bg1">
-                      <a:lumMod val="75000"/>
-                      <a:lumOff val="25000"/>
-                      <a:alpha val="10000"/>
-                    </a:schemeClr>
-                  </a:solidFill>
-                </a:ln>
-                <a:solidFill>
-                  <a:schemeClr val="tx2"/>
-                </a:solidFill>
-                <a:effectLst>
-                  <a:outerShdw blurRad="9525" dist="25400" dir="14640000" algn="tl" rotWithShape="0">
-                    <a:schemeClr val="bg1">
-                      <a:alpha val="30000"/>
-                    </a:schemeClr>
-                  </a:outerShdw>
-                </a:effectLst>
-                <a:latin typeface="+mn-lt"/>
-                <a:ea typeface="+mn-ea"/>
-                <a:cs typeface="+mn-cs"/>
-              </a:defRPr>
-            </a:lvl1pPr>
-            <a:lvl2pPr marL="720000" indent="-270000" algn="l" defTabSz="457200" rtl="0" eaLnBrk="1" latinLnBrk="0" hangingPunct="1">
-              <a:spcBef>
-                <a:spcPct val="20000"/>
-              </a:spcBef>
-              <a:spcAft>
-                <a:spcPts val="600"/>
-              </a:spcAft>
-              <a:buClr>
-                <a:schemeClr val="tx2"/>
-              </a:buClr>
-              <a:buSzPct val="70000"/>
-              <a:buFont typeface="Wingdings 2" charset="2"/>
-              <a:buChar char=""/>
-              <a:defRPr sz="1800" kern="1200">
-                <a:ln>
-                  <a:solidFill>
-                    <a:schemeClr val="bg1">
-                      <a:lumMod val="75000"/>
-                      <a:lumOff val="25000"/>
-                      <a:alpha val="10000"/>
-                    </a:schemeClr>
-                  </a:solidFill>
-                </a:ln>
-                <a:solidFill>
-                  <a:schemeClr val="tx2"/>
-                </a:solidFill>
-                <a:effectLst>
-                  <a:outerShdw blurRad="9525" dist="25400" dir="14640000" algn="tl" rotWithShape="0">
-                    <a:schemeClr val="bg1">
-                      <a:alpha val="30000"/>
-                    </a:schemeClr>
-                  </a:outerShdw>
-                </a:effectLst>
-                <a:latin typeface="+mn-lt"/>
-                <a:ea typeface="+mn-ea"/>
-                <a:cs typeface="+mn-cs"/>
-              </a:defRPr>
-            </a:lvl2pPr>
-            <a:lvl3pPr marL="1026000" indent="-216000" algn="l" defTabSz="457200" rtl="0" eaLnBrk="1" latinLnBrk="0" hangingPunct="1">
-              <a:spcBef>
-                <a:spcPct val="20000"/>
-              </a:spcBef>
-              <a:spcAft>
-                <a:spcPts val="600"/>
-              </a:spcAft>
-              <a:buClr>
-                <a:schemeClr val="tx2"/>
-              </a:buClr>
-              <a:buSzPct val="70000"/>
-              <a:buFont typeface="Wingdings 2" charset="2"/>
-              <a:buChar char=""/>
-              <a:defRPr sz="1600" kern="1200">
-                <a:ln>
-                  <a:solidFill>
-                    <a:schemeClr val="bg1">
-                      <a:lumMod val="75000"/>
-                      <a:lumOff val="25000"/>
-                      <a:alpha val="10000"/>
-                    </a:schemeClr>
-                  </a:solidFill>
-                </a:ln>
-                <a:solidFill>
-                  <a:schemeClr val="tx2"/>
-                </a:solidFill>
-                <a:effectLst>
-                  <a:outerShdw blurRad="9525" dist="25400" dir="14640000" algn="tl" rotWithShape="0">
-                    <a:schemeClr val="bg1">
-                      <a:alpha val="30000"/>
-                    </a:schemeClr>
-                  </a:outerShdw>
-                </a:effectLst>
-                <a:latin typeface="+mn-lt"/>
-                <a:ea typeface="+mn-ea"/>
-                <a:cs typeface="+mn-cs"/>
-              </a:defRPr>
-            </a:lvl3pPr>
-            <a:lvl4pPr marL="1386000" indent="-216000" algn="l" defTabSz="457200" rtl="0" eaLnBrk="1" latinLnBrk="0" hangingPunct="1">
-              <a:spcBef>
-                <a:spcPct val="20000"/>
-              </a:spcBef>
-              <a:spcAft>
-                <a:spcPts val="600"/>
-              </a:spcAft>
-              <a:buClr>
-                <a:schemeClr val="tx2"/>
-              </a:buClr>
-              <a:buSzPct val="70000"/>
-              <a:buFont typeface="Wingdings 2" charset="2"/>
-              <a:buChar char=""/>
-              <a:defRPr sz="1400" kern="1200">
-                <a:ln>
-                  <a:solidFill>
-                    <a:schemeClr val="bg1">
-                      <a:lumMod val="75000"/>
-                      <a:lumOff val="25000"/>
-                      <a:alpha val="10000"/>
-                    </a:schemeClr>
-                  </a:solidFill>
-                </a:ln>
-                <a:solidFill>
-                  <a:schemeClr val="tx2"/>
-                </a:solidFill>
-                <a:effectLst>
-                  <a:outerShdw blurRad="9525" dist="25400" dir="14640000" algn="tl" rotWithShape="0">
-                    <a:schemeClr val="bg1">
-                      <a:alpha val="30000"/>
-                    </a:schemeClr>
-                  </a:outerShdw>
-                </a:effectLst>
-                <a:latin typeface="+mn-lt"/>
-                <a:ea typeface="+mn-ea"/>
-                <a:cs typeface="+mn-cs"/>
-              </a:defRPr>
-            </a:lvl4pPr>
-            <a:lvl5pPr marL="1674000" indent="-216000" algn="l" defTabSz="457200" rtl="0" eaLnBrk="1" latinLnBrk="0" hangingPunct="1">
-              <a:spcBef>
-                <a:spcPct val="20000"/>
-              </a:spcBef>
-              <a:spcAft>
-                <a:spcPts val="600"/>
-              </a:spcAft>
-              <a:buClr>
-                <a:schemeClr val="tx2"/>
-              </a:buClr>
-              <a:buSzPct val="70000"/>
-              <a:buFont typeface="Wingdings 2" charset="2"/>
-              <a:buChar char=""/>
-              <a:defRPr sz="1400" kern="1200">
-                <a:ln>
-                  <a:solidFill>
-                    <a:schemeClr val="bg1">
-                      <a:lumMod val="75000"/>
-                      <a:lumOff val="25000"/>
-                      <a:alpha val="10000"/>
-                    </a:schemeClr>
-                  </a:solidFill>
-                </a:ln>
-                <a:solidFill>
-                  <a:schemeClr val="tx2"/>
-                </a:solidFill>
-                <a:effectLst>
-                  <a:outerShdw blurRad="9525" dist="25400" dir="14640000" algn="tl" rotWithShape="0">
-                    <a:schemeClr val="bg1">
-                      <a:alpha val="30000"/>
-                    </a:schemeClr>
-                  </a:outerShdw>
-                </a:effectLst>
-                <a:latin typeface="+mn-lt"/>
-                <a:ea typeface="+mn-ea"/>
-                <a:cs typeface="+mn-cs"/>
-              </a:defRPr>
-            </a:lvl5pPr>
-            <a:lvl6pPr marL="2014600" indent="-228600" algn="l" defTabSz="457200" rtl="0" eaLnBrk="1" latinLnBrk="0" hangingPunct="1">
-              <a:spcBef>
-                <a:spcPct val="20000"/>
-              </a:spcBef>
-              <a:spcAft>
-                <a:spcPts val="600"/>
-              </a:spcAft>
-              <a:buClr>
-                <a:schemeClr val="tx2"/>
-              </a:buClr>
-              <a:buSzPct val="70000"/>
-              <a:buFont typeface="Wingdings 2" charset="2"/>
-              <a:buChar char=""/>
-              <a:defRPr sz="1400" kern="1200">
-                <a:ln>
-                  <a:solidFill>
-                    <a:schemeClr val="bg1">
-                      <a:lumMod val="75000"/>
-                      <a:lumOff val="25000"/>
-                      <a:alpha val="10000"/>
-                    </a:schemeClr>
-                  </a:solidFill>
-                </a:ln>
-                <a:solidFill>
-                  <a:schemeClr val="tx2"/>
-                </a:solidFill>
-                <a:effectLst>
-                  <a:outerShdw blurRad="9525" dist="25400" dir="14640000" algn="tl" rotWithShape="0">
-                    <a:schemeClr val="bg1">
-                      <a:alpha val="30000"/>
-                    </a:schemeClr>
-                  </a:outerShdw>
-                </a:effectLst>
-                <a:latin typeface="+mn-lt"/>
-                <a:ea typeface="+mn-ea"/>
-                <a:cs typeface="+mn-cs"/>
-              </a:defRPr>
-            </a:lvl6pPr>
-            <a:lvl7pPr marL="2401800" indent="-228600" algn="l" defTabSz="457200" rtl="0" eaLnBrk="1" latinLnBrk="0" hangingPunct="1">
-              <a:spcBef>
-                <a:spcPct val="20000"/>
-              </a:spcBef>
-              <a:spcAft>
-                <a:spcPts val="600"/>
-              </a:spcAft>
-              <a:buClr>
-                <a:schemeClr val="tx2"/>
-              </a:buClr>
-              <a:buSzPct val="70000"/>
-              <a:buFont typeface="Wingdings 2" charset="2"/>
-              <a:buChar char=""/>
-              <a:defRPr sz="1400" kern="1200">
-                <a:ln>
-                  <a:solidFill>
-                    <a:schemeClr val="bg1">
-                      <a:lumMod val="75000"/>
-                      <a:lumOff val="25000"/>
-                      <a:alpha val="10000"/>
-                    </a:schemeClr>
-                  </a:solidFill>
-                </a:ln>
-                <a:solidFill>
-                  <a:schemeClr val="tx2"/>
-                </a:solidFill>
-                <a:effectLst>
-                  <a:outerShdw blurRad="9525" dist="25400" dir="14640000" algn="tl" rotWithShape="0">
-                    <a:schemeClr val="bg1">
-                      <a:alpha val="30000"/>
-                    </a:schemeClr>
-                  </a:outerShdw>
-                </a:effectLst>
-                <a:latin typeface="+mn-lt"/>
-                <a:ea typeface="+mn-ea"/>
-                <a:cs typeface="+mn-cs"/>
-              </a:defRPr>
-            </a:lvl7pPr>
-            <a:lvl8pPr marL="2789000" indent="-228600" algn="l" defTabSz="457200" rtl="0" eaLnBrk="1" latinLnBrk="0" hangingPunct="1">
-              <a:spcBef>
-                <a:spcPct val="20000"/>
-              </a:spcBef>
-              <a:spcAft>
-                <a:spcPts val="600"/>
-              </a:spcAft>
-              <a:buClr>
-                <a:schemeClr val="tx2"/>
-              </a:buClr>
-              <a:buSzPct val="70000"/>
-              <a:buFont typeface="Wingdings 2" charset="2"/>
-              <a:buChar char=""/>
-              <a:defRPr sz="1400" kern="1200">
-                <a:ln>
-                  <a:solidFill>
-                    <a:schemeClr val="bg1">
-                      <a:lumMod val="75000"/>
-                      <a:lumOff val="25000"/>
-                      <a:alpha val="10000"/>
-                    </a:schemeClr>
-                  </a:solidFill>
-                </a:ln>
-                <a:solidFill>
-                  <a:schemeClr val="tx2"/>
-                </a:solidFill>
-                <a:effectLst>
-                  <a:outerShdw blurRad="9525" dist="25400" dir="14640000" algn="tl" rotWithShape="0">
-                    <a:schemeClr val="bg1">
-                      <a:alpha val="30000"/>
-                    </a:schemeClr>
-                  </a:outerShdw>
-                </a:effectLst>
-                <a:latin typeface="+mn-lt"/>
-                <a:ea typeface="+mn-ea"/>
-                <a:cs typeface="+mn-cs"/>
-              </a:defRPr>
-            </a:lvl8pPr>
-            <a:lvl9pPr marL="3106200" indent="-228600" algn="l" defTabSz="457200" rtl="0" eaLnBrk="1" latinLnBrk="0" hangingPunct="1">
-              <a:spcBef>
-                <a:spcPct val="20000"/>
-              </a:spcBef>
-              <a:spcAft>
-                <a:spcPts val="600"/>
-              </a:spcAft>
-              <a:buClr>
-                <a:schemeClr val="tx2"/>
-              </a:buClr>
-              <a:buSzPct val="70000"/>
-              <a:buFont typeface="Wingdings 2" charset="2"/>
-              <a:buChar char=""/>
-              <a:defRPr sz="1400" kern="1200">
-                <a:ln>
-                  <a:solidFill>
-                    <a:schemeClr val="bg1">
-                      <a:lumMod val="75000"/>
-                      <a:lumOff val="25000"/>
-                      <a:alpha val="10000"/>
-                    </a:schemeClr>
-                  </a:solidFill>
-                </a:ln>
-                <a:solidFill>
-                  <a:schemeClr val="tx2"/>
-                </a:solidFill>
-                <a:effectLst>
-                  <a:outerShdw blurRad="9525" dist="25400" dir="14640000" algn="tl" rotWithShape="0">
-                    <a:schemeClr val="bg1">
-                      <a:alpha val="30000"/>
-                    </a:schemeClr>
-                  </a:outerShdw>
-                </a:effectLst>
-                <a:latin typeface="+mn-lt"/>
-                <a:ea typeface="+mn-ea"/>
-                <a:cs typeface="+mn-cs"/>
-              </a:defRPr>
-            </a:lvl9pPr>
-          </a:lstStyle>
-          <a:p>
-            <a:r>
-              <a:rPr lang="en-US" dirty="0"/>
-              <a:t>Clustering showed clear patterns for two distinct groups of people</a:t>
-            </a:r>
-          </a:p>
-          <a:p>
-            <a:pPr lvl="1"/>
-            <a:r>
-              <a:rPr lang="en-US" dirty="0"/>
-              <a:t>Casual/non-gamers and more involved gamers</a:t>
-            </a:r>
-          </a:p>
-          <a:p>
-            <a:r>
-              <a:rPr lang="en-US" dirty="0"/>
-              <a:t>Compared to the casual group, the involved gamers:</a:t>
-            </a:r>
-          </a:p>
-          <a:p>
-            <a:pPr lvl="1"/>
-            <a:r>
-              <a:rPr lang="en-US" dirty="0"/>
-              <a:t>Owned more board games</a:t>
-            </a:r>
-          </a:p>
-          <a:p>
-            <a:pPr lvl="1"/>
-            <a:r>
-              <a:rPr lang="en-US" dirty="0"/>
-              <a:t>Were more willing to play different types of games depending on the situation</a:t>
-            </a:r>
-          </a:p>
-          <a:p>
-            <a:pPr lvl="1"/>
-            <a:r>
-              <a:rPr lang="en-US" dirty="0"/>
-              <a:t>Were more likely enjoy any given category of genre and gameplay element</a:t>
-            </a:r>
-          </a:p>
-          <a:p>
-            <a:pPr lvl="1"/>
-            <a:r>
-              <a:rPr lang="en-US" dirty="0"/>
-              <a:t>Suggests a broader range of tastes than the more casual group</a:t>
-            </a:r>
-          </a:p>
-        </p:txBody>
-      </p:sp>
     </p:spTree>
     <p:extLst>
       <p:ext uri="{BB962C8B-B14F-4D97-AF65-F5344CB8AC3E}">
@@ -8003,7 +7409,7 @@
 </p:sld>
 </file>
 
-<file path=ppt/slides/slide13.xml><?xml version="1.0" encoding="utf-8"?>
+<file path=ppt/slides/slide11.xml><?xml version="1.0" encoding="utf-8"?>
 <p:sld xmlns:a="http://schemas.openxmlformats.org/drawingml/2006/main" xmlns:r="http://schemas.openxmlformats.org/officeDocument/2006/relationships" xmlns:p="http://schemas.openxmlformats.org/presentationml/2006/main">
   <p:cSld>
     <p:bg>
@@ -8198,6 +7604,101 @@
           </a:prstGeom>
         </p:spPr>
       </p:pic>
+      <p:sp>
+        <p:nvSpPr>
+          <p:cNvPr id="5" name="Title 1">
+            <a:extLst>
+              <a:ext uri="{FF2B5EF4-FFF2-40B4-BE49-F238E27FC236}">
+                <a16:creationId xmlns:a16="http://schemas.microsoft.com/office/drawing/2014/main" id="{AE548798-75AF-5A0D-4E8B-75D46EC16CE0}"/>
+              </a:ext>
+            </a:extLst>
+          </p:cNvPr>
+          <p:cNvSpPr>
+            <a:spLocks noGrp="1"/>
+          </p:cNvSpPr>
+          <p:nvPr>
+            <p:ph type="title"/>
+          </p:nvPr>
+        </p:nvSpPr>
+        <p:spPr>
+          <a:xfrm>
+            <a:off x="0" y="-337930"/>
+            <a:ext cx="3121492" cy="1146313"/>
+          </a:xfrm>
+          <a:solidFill>
+            <a:schemeClr val="tx1"/>
+          </a:solidFill>
+        </p:spPr>
+        <p:txBody>
+          <a:bodyPr>
+            <a:normAutofit fontScale="90000"/>
+          </a:bodyPr>
+          <a:lstStyle/>
+          <a:p>
+            <a:br>
+              <a:rPr lang="en-US" dirty="0">
+                <a:solidFill>
+                  <a:schemeClr val="bg1"/>
+                </a:solidFill>
+                <a:effectLst/>
+              </a:rPr>
+            </a:br>
+            <a:r>
+              <a:rPr lang="en-US" dirty="0">
+                <a:solidFill>
+                  <a:schemeClr val="bg1"/>
+                </a:solidFill>
+                <a:effectLst/>
+              </a:rPr>
+              <a:t>Clustering</a:t>
+            </a:r>
+          </a:p>
+        </p:txBody>
+      </p:sp>
+      <p:sp>
+        <p:nvSpPr>
+          <p:cNvPr id="4" name="TextBox 3">
+            <a:extLst>
+              <a:ext uri="{FF2B5EF4-FFF2-40B4-BE49-F238E27FC236}">
+                <a16:creationId xmlns:a16="http://schemas.microsoft.com/office/drawing/2014/main" id="{37EC643F-60BB-6B9E-6940-C367E324716F}"/>
+              </a:ext>
+            </a:extLst>
+          </p:cNvPr>
+          <p:cNvSpPr txBox="1"/>
+          <p:nvPr/>
+        </p:nvSpPr>
+        <p:spPr>
+          <a:xfrm>
+            <a:off x="0" y="12250"/>
+            <a:ext cx="2504661" cy="369332"/>
+          </a:xfrm>
+          <a:prstGeom prst="rect">
+            <a:avLst/>
+          </a:prstGeom>
+          <a:noFill/>
+        </p:spPr>
+        <p:txBody>
+          <a:bodyPr wrap="square" rtlCol="0">
+            <a:spAutoFit/>
+          </a:bodyPr>
+          <a:lstStyle/>
+          <a:p>
+            <a:r>
+              <a:rPr lang="en-US" sz="1800" dirty="0">
+                <a:solidFill>
+                  <a:schemeClr val="bg1"/>
+                </a:solidFill>
+              </a:rPr>
+              <a:t>Exploratory Analysis:</a:t>
+            </a:r>
+            <a:endParaRPr lang="en-US" dirty="0">
+              <a:solidFill>
+                <a:schemeClr val="bg1"/>
+              </a:solidFill>
+            </a:endParaRPr>
+          </a:p>
+        </p:txBody>
+      </p:sp>
     </p:spTree>
     <p:extLst>
       <p:ext uri="{BB962C8B-B14F-4D97-AF65-F5344CB8AC3E}">
@@ -8211,7 +7712,7 @@
 </p:sld>
 </file>
 
-<file path=ppt/slides/slide14.xml><?xml version="1.0" encoding="utf-8"?>
+<file path=ppt/slides/slide12.xml><?xml version="1.0" encoding="utf-8"?>
 <p:sld xmlns:a="http://schemas.openxmlformats.org/drawingml/2006/main" xmlns:r="http://schemas.openxmlformats.org/officeDocument/2006/relationships" xmlns:p="http://schemas.openxmlformats.org/presentationml/2006/main">
   <p:cSld>
     <p:spTree>
@@ -9523,7 +9024,7 @@
 </p:sld>
 </file>
 
-<file path=ppt/slides/slide15.xml><?xml version="1.0" encoding="utf-8"?>
+<file path=ppt/slides/slide13.xml><?xml version="1.0" encoding="utf-8"?>
 <p:sld xmlns:a="http://schemas.openxmlformats.org/drawingml/2006/main" xmlns:r="http://schemas.openxmlformats.org/officeDocument/2006/relationships" xmlns:p="http://schemas.openxmlformats.org/presentationml/2006/main">
   <p:cSld>
     <p:spTree>
@@ -11411,7 +10912,7 @@
 </p:sld>
 </file>
 
-<file path=ppt/slides/slide16.xml><?xml version="1.0" encoding="utf-8"?>
+<file path=ppt/slides/slide14.xml><?xml version="1.0" encoding="utf-8"?>
 <p:sld xmlns:a="http://schemas.openxmlformats.org/drawingml/2006/main" xmlns:r="http://schemas.openxmlformats.org/officeDocument/2006/relationships" xmlns:p="http://schemas.openxmlformats.org/presentationml/2006/main">
   <p:cSld>
     <p:spTree>
@@ -11561,7 +11062,7 @@
 </p:sld>
 </file>
 
-<file path=ppt/slides/slide17.xml><?xml version="1.0" encoding="utf-8"?>
+<file path=ppt/slides/slide15.xml><?xml version="1.0" encoding="utf-8"?>
 <p:sld xmlns:a="http://schemas.openxmlformats.org/drawingml/2006/main" xmlns:r="http://schemas.openxmlformats.org/officeDocument/2006/relationships" xmlns:p="http://schemas.openxmlformats.org/presentationml/2006/main">
   <p:cSld>
     <p:spTree>
@@ -13208,7 +12709,7 @@
                 </a:solidFill>
                 <a:effectLst/>
               </a:rPr>
-              <a:t>Produce Normalized Bar Plots for Many Combinations of Features</a:t>
+              <a:t>Produce normalized Bar Plots for many combinations of features</a:t>
             </a:r>
           </a:p>
           <a:p>
@@ -13419,8 +12920,8 @@
         </p:nvSpPr>
         <p:spPr>
           <a:xfrm>
-            <a:off x="913795" y="609600"/>
-            <a:ext cx="4388360" cy="970450"/>
+            <a:off x="913795" y="669234"/>
+            <a:ext cx="4388360" cy="910815"/>
           </a:xfrm>
         </p:spPr>
         <p:txBody>
@@ -13431,7 +12932,7 @@
           <a:p>
             <a:r>
               <a:rPr lang="en-US" dirty="0"/>
-              <a:t>Discoveries (1/5)</a:t>
+              <a:t>Discoveries (1/3)</a:t>
             </a:r>
           </a:p>
         </p:txBody>
@@ -13494,14 +12995,155 @@
         </p:blipFill>
         <p:spPr>
           <a:xfrm>
-            <a:off x="1835624" y="1518312"/>
-            <a:ext cx="8810837" cy="4964374"/>
+            <a:off x="4083330" y="1679655"/>
+            <a:ext cx="8108670" cy="4568745"/>
           </a:xfrm>
           <a:prstGeom prst="rect">
             <a:avLst/>
           </a:prstGeom>
         </p:spPr>
       </p:pic>
+      <p:sp>
+        <p:nvSpPr>
+          <p:cNvPr id="5" name="Content Placeholder 12">
+            <a:extLst>
+              <a:ext uri="{FF2B5EF4-FFF2-40B4-BE49-F238E27FC236}">
+                <a16:creationId xmlns:a16="http://schemas.microsoft.com/office/drawing/2014/main" id="{1D6A3DA7-F5E3-BBE1-D5B7-A8883910B130}"/>
+              </a:ext>
+            </a:extLst>
+          </p:cNvPr>
+          <p:cNvSpPr>
+            <a:spLocks noGrp="1"/>
+          </p:cNvSpPr>
+          <p:nvPr>
+            <p:ph idx="1"/>
+          </p:nvPr>
+        </p:nvSpPr>
+        <p:spPr>
+          <a:xfrm>
+            <a:off x="742123" y="1757803"/>
+            <a:ext cx="3034748" cy="4074307"/>
+          </a:xfrm>
+        </p:spPr>
+        <p:txBody>
+          <a:bodyPr anchor="t">
+            <a:noAutofit/>
+          </a:bodyPr>
+          <a:lstStyle/>
+          <a:p>
+            <a:pPr>
+              <a:buClr>
+                <a:srgbClr val="E88834"/>
+              </a:buClr>
+            </a:pPr>
+            <a:r>
+              <a:rPr lang="en-US" sz="1800" dirty="0">
+                <a:ln>
+                  <a:solidFill>
+                    <a:srgbClr val="404040">
+                      <a:alpha val="10000"/>
+                    </a:srgbClr>
+                  </a:solidFill>
+                </a:ln>
+                <a:solidFill>
+                  <a:srgbClr val="DADADA"/>
+                </a:solidFill>
+                <a:effectLst/>
+              </a:rPr>
+              <a:t>Player Style influences Chess Rating distribution</a:t>
+            </a:r>
+          </a:p>
+          <a:p>
+            <a:pPr>
+              <a:buClr>
+                <a:srgbClr val="E88834"/>
+              </a:buClr>
+            </a:pPr>
+            <a:r>
+              <a:rPr lang="en-US" sz="1800" dirty="0">
+                <a:ln>
+                  <a:solidFill>
+                    <a:srgbClr val="404040">
+                      <a:alpha val="10000"/>
+                    </a:srgbClr>
+                  </a:solidFill>
+                </a:ln>
+                <a:solidFill>
+                  <a:srgbClr val="DADADA"/>
+                </a:solidFill>
+                <a:effectLst/>
+              </a:rPr>
+              <a:t>Strategic Players are generally favorable towards Chess</a:t>
+            </a:r>
+          </a:p>
+          <a:p>
+            <a:pPr>
+              <a:buClr>
+                <a:srgbClr val="E88834"/>
+              </a:buClr>
+            </a:pPr>
+            <a:r>
+              <a:rPr lang="en-US" sz="1800" dirty="0">
+                <a:ln>
+                  <a:solidFill>
+                    <a:srgbClr val="404040">
+                      <a:alpha val="10000"/>
+                    </a:srgbClr>
+                  </a:solidFill>
+                </a:ln>
+                <a:solidFill>
+                  <a:srgbClr val="DADADA"/>
+                </a:solidFill>
+                <a:effectLst/>
+              </a:rPr>
+              <a:t>Situation-Specific and Casual Players are relatively indifferent</a:t>
+            </a:r>
+          </a:p>
+          <a:p>
+            <a:pPr>
+              <a:buClr>
+                <a:srgbClr val="E88834"/>
+              </a:buClr>
+            </a:pPr>
+            <a:r>
+              <a:rPr lang="en-US" sz="1800" dirty="0">
+                <a:ln>
+                  <a:solidFill>
+                    <a:srgbClr val="404040">
+                      <a:alpha val="10000"/>
+                    </a:srgbClr>
+                  </a:solidFill>
+                </a:ln>
+                <a:solidFill>
+                  <a:srgbClr val="DADADA"/>
+                </a:solidFill>
+                <a:effectLst/>
+              </a:rPr>
+              <a:t>Party/Social and all other players never rated it higher than a 7 </a:t>
+            </a:r>
+          </a:p>
+          <a:p>
+            <a:pPr>
+              <a:buClr>
+                <a:srgbClr val="E88834"/>
+              </a:buClr>
+            </a:pPr>
+            <a:endParaRPr lang="en-US" sz="1800" dirty="0">
+              <a:ln>
+                <a:solidFill>
+                  <a:srgbClr val="404040">
+                    <a:alpha val="10000"/>
+                  </a:srgbClr>
+                </a:solidFill>
+              </a:ln>
+              <a:solidFill>
+                <a:srgbClr val="DADADA"/>
+              </a:solidFill>
+              <a:effectLst/>
+            </a:endParaRPr>
+          </a:p>
+        </p:txBody>
+      </p:sp>
     </p:spTree>
     <p:extLst>
       <p:ext uri="{BB962C8B-B14F-4D97-AF65-F5344CB8AC3E}">
@@ -13551,32 +13193,88 @@
         <p:spPr>
           <a:xfrm>
             <a:off x="913795" y="1732449"/>
-            <a:ext cx="4681462" cy="4515951"/>
+            <a:ext cx="3876866" cy="4515951"/>
           </a:xfrm>
         </p:spPr>
         <p:txBody>
           <a:bodyPr>
-            <a:normAutofit/>
+            <a:normAutofit fontScale="92500" lnSpcReduction="10000"/>
           </a:bodyPr>
           <a:lstStyle/>
           <a:p>
             <a:r>
               <a:rPr lang="en-US" dirty="0"/>
-              <a:t>Out of Demographic Information, Gender showed the clearest patterns</a:t>
+              <a:t>Graphing Gender Against Enjoyed Genres reveals:</a:t>
             </a:r>
           </a:p>
           <a:p>
             <a:pPr lvl="1"/>
             <a:r>
               <a:rPr lang="en-US" dirty="0"/>
-              <a:t>Women were significantly more likely than Men to select “Animals”, “Puzzle”, “Party”, “Memory”, “Trivia”, and “Luck” as enjoyed genres</a:t>
+              <a:t>Women are significantly more likely than Men to select:</a:t>
+            </a:r>
+          </a:p>
+          <a:p>
+            <a:pPr lvl="2"/>
+            <a:r>
+              <a:rPr lang="en-US" dirty="0"/>
+              <a:t>“Animals”</a:t>
+            </a:r>
+          </a:p>
+          <a:p>
+            <a:pPr lvl="2"/>
+            <a:r>
+              <a:rPr lang="en-US" dirty="0"/>
+              <a:t>“Puzzle”</a:t>
+            </a:r>
+          </a:p>
+          <a:p>
+            <a:pPr lvl="2"/>
+            <a:r>
+              <a:rPr lang="en-US" dirty="0"/>
+              <a:t>“Party/Social”</a:t>
+            </a:r>
+          </a:p>
+          <a:p>
+            <a:pPr lvl="2"/>
+            <a:r>
+              <a:rPr lang="en-US" dirty="0"/>
+              <a:t>“Memory”</a:t>
+            </a:r>
+          </a:p>
+          <a:p>
+            <a:pPr lvl="2"/>
+            <a:r>
+              <a:rPr lang="en-US" dirty="0"/>
+              <a:t>“Trivia”</a:t>
+            </a:r>
+          </a:p>
+          <a:p>
+            <a:pPr lvl="2"/>
+            <a:r>
+              <a:rPr lang="en-US" dirty="0"/>
+              <a:t>“Luck”</a:t>
             </a:r>
           </a:p>
           <a:p>
             <a:pPr lvl="1"/>
             <a:r>
               <a:rPr lang="en-US" dirty="0"/>
-              <a:t>Respondents identifying as male were significantly more likely than women to select science fiction and World War II as enjoyed genres</a:t>
+              <a:t>Men were significantly more likely than Women to select:</a:t>
+            </a:r>
+          </a:p>
+          <a:p>
+            <a:pPr lvl="2"/>
+            <a:r>
+              <a:rPr lang="en-US" dirty="0"/>
+              <a:t>“Science Fiction”</a:t>
+            </a:r>
+          </a:p>
+          <a:p>
+            <a:pPr lvl="2"/>
+            <a:r>
+              <a:rPr lang="en-US" dirty="0"/>
+              <a:t>“World War II”</a:t>
             </a:r>
           </a:p>
         </p:txBody>
@@ -13603,144 +13301,14 @@
         </p:blipFill>
         <p:spPr>
           <a:xfrm>
-            <a:off x="6291942" y="916499"/>
-            <a:ext cx="5116286" cy="5025002"/>
+            <a:off x="5209418" y="0"/>
+            <a:ext cx="6982582" cy="6858000"/>
           </a:xfrm>
           <a:prstGeom prst="rect">
             <a:avLst/>
           </a:prstGeom>
         </p:spPr>
       </p:pic>
-      <p:sp>
-        <p:nvSpPr>
-          <p:cNvPr id="8" name="Title 1">
-            <a:extLst>
-              <a:ext uri="{FF2B5EF4-FFF2-40B4-BE49-F238E27FC236}">
-                <a16:creationId xmlns:a16="http://schemas.microsoft.com/office/drawing/2014/main" id="{4BA00923-1106-3057-DA4A-0198F1C013F2}"/>
-              </a:ext>
-            </a:extLst>
-          </p:cNvPr>
-          <p:cNvSpPr txBox="1">
-            <a:spLocks/>
-          </p:cNvSpPr>
-          <p:nvPr/>
-        </p:nvSpPr>
-        <p:spPr>
-          <a:xfrm>
-            <a:off x="913795" y="609600"/>
-            <a:ext cx="4388360" cy="970450"/>
-          </a:xfrm>
-          <a:prstGeom prst="rect">
-            <a:avLst/>
-          </a:prstGeom>
-          <a:effectLst>
-            <a:outerShdw blurRad="25400" dir="17880000">
-              <a:srgbClr val="000000">
-                <a:alpha val="46000"/>
-              </a:srgbClr>
-            </a:outerShdw>
-          </a:effectLst>
-        </p:spPr>
-        <p:txBody>
-          <a:bodyPr vert="horz" lIns="91440" tIns="45720" rIns="91440" bIns="45720" rtlCol="0" anchor="ctr">
-            <a:normAutofit/>
-          </a:bodyPr>
-          <a:lstStyle>
-            <a:lvl1pPr algn="ctr" defTabSz="457200" rtl="0" eaLnBrk="1" latinLnBrk="0" hangingPunct="1">
-              <a:spcBef>
-                <a:spcPct val="0"/>
-              </a:spcBef>
-              <a:buNone/>
-              <a:defRPr sz="4000" kern="1200">
-                <a:ln>
-                  <a:solidFill>
-                    <a:schemeClr val="bg1">
-                      <a:lumMod val="75000"/>
-                      <a:lumOff val="25000"/>
-                      <a:alpha val="10000"/>
-                    </a:schemeClr>
-                  </a:solidFill>
-                </a:ln>
-                <a:solidFill>
-                  <a:schemeClr val="tx2"/>
-                </a:solidFill>
-                <a:effectLst>
-                  <a:outerShdw blurRad="9525" dist="25400" dir="14640000" algn="tl" rotWithShape="0">
-                    <a:schemeClr val="bg1">
-                      <a:alpha val="30000"/>
-                    </a:schemeClr>
-                  </a:outerShdw>
-                </a:effectLst>
-                <a:latin typeface="+mj-lt"/>
-                <a:ea typeface="+mj-ea"/>
-                <a:cs typeface="Trebuchet MS"/>
-              </a:defRPr>
-            </a:lvl1pPr>
-            <a:lvl2pPr eaLnBrk="1" hangingPunct="1">
-              <a:defRPr>
-                <a:solidFill>
-                  <a:schemeClr val="tx2"/>
-                </a:solidFill>
-              </a:defRPr>
-            </a:lvl2pPr>
-            <a:lvl3pPr eaLnBrk="1" hangingPunct="1">
-              <a:defRPr>
-                <a:solidFill>
-                  <a:schemeClr val="tx2"/>
-                </a:solidFill>
-              </a:defRPr>
-            </a:lvl3pPr>
-            <a:lvl4pPr eaLnBrk="1" hangingPunct="1">
-              <a:defRPr>
-                <a:solidFill>
-                  <a:schemeClr val="tx2"/>
-                </a:solidFill>
-              </a:defRPr>
-            </a:lvl4pPr>
-            <a:lvl5pPr eaLnBrk="1" hangingPunct="1">
-              <a:defRPr>
-                <a:solidFill>
-                  <a:schemeClr val="tx2"/>
-                </a:solidFill>
-              </a:defRPr>
-            </a:lvl5pPr>
-            <a:lvl6pPr eaLnBrk="1" hangingPunct="1">
-              <a:defRPr>
-                <a:solidFill>
-                  <a:schemeClr val="tx2"/>
-                </a:solidFill>
-              </a:defRPr>
-            </a:lvl6pPr>
-            <a:lvl7pPr eaLnBrk="1" hangingPunct="1">
-              <a:defRPr>
-                <a:solidFill>
-                  <a:schemeClr val="tx2"/>
-                </a:solidFill>
-              </a:defRPr>
-            </a:lvl7pPr>
-            <a:lvl8pPr eaLnBrk="1" hangingPunct="1">
-              <a:defRPr>
-                <a:solidFill>
-                  <a:schemeClr val="tx2"/>
-                </a:solidFill>
-              </a:defRPr>
-            </a:lvl8pPr>
-            <a:lvl9pPr eaLnBrk="1" hangingPunct="1">
-              <a:defRPr>
-                <a:solidFill>
-                  <a:schemeClr val="tx2"/>
-                </a:solidFill>
-              </a:defRPr>
-            </a:lvl9pPr>
-          </a:lstStyle>
-          <a:p>
-            <a:r>
-              <a:rPr lang="en-US" dirty="0"/>
-              <a:t>Discoveries (2/5)</a:t>
-            </a:r>
-          </a:p>
-        </p:txBody>
-      </p:sp>
       <p:sp>
         <p:nvSpPr>
           <p:cNvPr id="9" name="TextBox 8">
@@ -13774,6 +13342,41 @@
               <a:t>Exploratory Analysis:</a:t>
             </a:r>
             <a:endParaRPr lang="en-US" dirty="0"/>
+          </a:p>
+        </p:txBody>
+      </p:sp>
+      <p:sp>
+        <p:nvSpPr>
+          <p:cNvPr id="2" name="Title 1">
+            <a:extLst>
+              <a:ext uri="{FF2B5EF4-FFF2-40B4-BE49-F238E27FC236}">
+                <a16:creationId xmlns:a16="http://schemas.microsoft.com/office/drawing/2014/main" id="{24DA0A25-3947-FA4A-055C-431D598E2B12}"/>
+              </a:ext>
+            </a:extLst>
+          </p:cNvPr>
+          <p:cNvSpPr>
+            <a:spLocks noGrp="1"/>
+          </p:cNvSpPr>
+          <p:nvPr>
+            <p:ph type="title"/>
+          </p:nvPr>
+        </p:nvSpPr>
+        <p:spPr>
+          <a:xfrm>
+            <a:off x="913795" y="669234"/>
+            <a:ext cx="4388360" cy="910815"/>
+          </a:xfrm>
+        </p:spPr>
+        <p:txBody>
+          <a:bodyPr>
+            <a:normAutofit/>
+          </a:bodyPr>
+          <a:lstStyle/>
+          <a:p>
+            <a:r>
+              <a:rPr lang="en-US" dirty="0"/>
+              <a:t>Discoveries (2/3)</a:t>
+            </a:r>
           </a:p>
         </p:txBody>
       </p:sp>
@@ -13809,41 +13412,6 @@
       </p:grpSpPr>
       <p:sp>
         <p:nvSpPr>
-          <p:cNvPr id="2" name="Title 1">
-            <a:extLst>
-              <a:ext uri="{FF2B5EF4-FFF2-40B4-BE49-F238E27FC236}">
-                <a16:creationId xmlns:a16="http://schemas.microsoft.com/office/drawing/2014/main" id="{56BE8B42-884F-A127-F785-060B2432FACC}"/>
-              </a:ext>
-            </a:extLst>
-          </p:cNvPr>
-          <p:cNvSpPr>
-            <a:spLocks noGrp="1"/>
-          </p:cNvSpPr>
-          <p:nvPr>
-            <p:ph type="title"/>
-          </p:nvPr>
-        </p:nvSpPr>
-        <p:spPr>
-          <a:xfrm>
-            <a:off x="913795" y="609600"/>
-            <a:ext cx="4388360" cy="970450"/>
-          </a:xfrm>
-        </p:spPr>
-        <p:txBody>
-          <a:bodyPr>
-            <a:normAutofit/>
-          </a:bodyPr>
-          <a:lstStyle/>
-          <a:p>
-            <a:r>
-              <a:rPr lang="en-US" dirty="0"/>
-              <a:t>Discoveries (3/5)</a:t>
-            </a:r>
-          </a:p>
-        </p:txBody>
-      </p:sp>
-      <p:sp>
-        <p:nvSpPr>
           <p:cNvPr id="4" name="TextBox 3">
             <a:extLst>
               <a:ext uri="{FF2B5EF4-FFF2-40B4-BE49-F238E27FC236}">
@@ -13878,10 +13446,170 @@
           </a:p>
         </p:txBody>
       </p:sp>
+      <p:sp>
+        <p:nvSpPr>
+          <p:cNvPr id="6" name="Title 1">
+            <a:extLst>
+              <a:ext uri="{FF2B5EF4-FFF2-40B4-BE49-F238E27FC236}">
+                <a16:creationId xmlns:a16="http://schemas.microsoft.com/office/drawing/2014/main" id="{77B906AB-CE44-0AC9-0D89-04588AF0840B}"/>
+              </a:ext>
+            </a:extLst>
+          </p:cNvPr>
+          <p:cNvSpPr txBox="1">
+            <a:spLocks/>
+          </p:cNvSpPr>
+          <p:nvPr/>
+        </p:nvSpPr>
+        <p:spPr>
+          <a:xfrm>
+            <a:off x="913795" y="669234"/>
+            <a:ext cx="4388360" cy="910815"/>
+          </a:xfrm>
+          <a:prstGeom prst="rect">
+            <a:avLst/>
+          </a:prstGeom>
+          <a:effectLst>
+            <a:outerShdw blurRad="25400" dir="17880000">
+              <a:srgbClr val="000000">
+                <a:alpha val="46000"/>
+              </a:srgbClr>
+            </a:outerShdw>
+          </a:effectLst>
+        </p:spPr>
+        <p:txBody>
+          <a:bodyPr vert="horz" lIns="91440" tIns="45720" rIns="91440" bIns="45720" rtlCol="0" anchor="ctr">
+            <a:normAutofit/>
+          </a:bodyPr>
+          <a:lstStyle>
+            <a:lvl1pPr algn="ctr" defTabSz="457200" rtl="0" eaLnBrk="1" latinLnBrk="0" hangingPunct="1">
+              <a:spcBef>
+                <a:spcPct val="0"/>
+              </a:spcBef>
+              <a:buNone/>
+              <a:defRPr sz="4000" kern="1200">
+                <a:ln>
+                  <a:solidFill>
+                    <a:schemeClr val="bg1">
+                      <a:lumMod val="75000"/>
+                      <a:lumOff val="25000"/>
+                      <a:alpha val="10000"/>
+                    </a:schemeClr>
+                  </a:solidFill>
+                </a:ln>
+                <a:solidFill>
+                  <a:schemeClr val="tx2"/>
+                </a:solidFill>
+                <a:effectLst>
+                  <a:outerShdw blurRad="9525" dist="25400" dir="14640000" algn="tl" rotWithShape="0">
+                    <a:schemeClr val="bg1">
+                      <a:alpha val="30000"/>
+                    </a:schemeClr>
+                  </a:outerShdw>
+                </a:effectLst>
+                <a:latin typeface="+mj-lt"/>
+                <a:ea typeface="+mj-ea"/>
+                <a:cs typeface="Trebuchet MS"/>
+              </a:defRPr>
+            </a:lvl1pPr>
+            <a:lvl2pPr eaLnBrk="1" hangingPunct="1">
+              <a:defRPr>
+                <a:solidFill>
+                  <a:schemeClr val="tx2"/>
+                </a:solidFill>
+              </a:defRPr>
+            </a:lvl2pPr>
+            <a:lvl3pPr eaLnBrk="1" hangingPunct="1">
+              <a:defRPr>
+                <a:solidFill>
+                  <a:schemeClr val="tx2"/>
+                </a:solidFill>
+              </a:defRPr>
+            </a:lvl3pPr>
+            <a:lvl4pPr eaLnBrk="1" hangingPunct="1">
+              <a:defRPr>
+                <a:solidFill>
+                  <a:schemeClr val="tx2"/>
+                </a:solidFill>
+              </a:defRPr>
+            </a:lvl4pPr>
+            <a:lvl5pPr eaLnBrk="1" hangingPunct="1">
+              <a:defRPr>
+                <a:solidFill>
+                  <a:schemeClr val="tx2"/>
+                </a:solidFill>
+              </a:defRPr>
+            </a:lvl5pPr>
+            <a:lvl6pPr eaLnBrk="1" hangingPunct="1">
+              <a:defRPr>
+                <a:solidFill>
+                  <a:schemeClr val="tx2"/>
+                </a:solidFill>
+              </a:defRPr>
+            </a:lvl6pPr>
+            <a:lvl7pPr eaLnBrk="1" hangingPunct="1">
+              <a:defRPr>
+                <a:solidFill>
+                  <a:schemeClr val="tx2"/>
+                </a:solidFill>
+              </a:defRPr>
+            </a:lvl7pPr>
+            <a:lvl8pPr eaLnBrk="1" hangingPunct="1">
+              <a:defRPr>
+                <a:solidFill>
+                  <a:schemeClr val="tx2"/>
+                </a:solidFill>
+              </a:defRPr>
+            </a:lvl8pPr>
+            <a:lvl9pPr eaLnBrk="1" hangingPunct="1">
+              <a:defRPr>
+                <a:solidFill>
+                  <a:schemeClr val="tx2"/>
+                </a:solidFill>
+              </a:defRPr>
+            </a:lvl9pPr>
+          </a:lstStyle>
+          <a:p>
+            <a:r>
+              <a:rPr lang="en-US" dirty="0"/>
+              <a:t>Discoveries (3/3)</a:t>
+            </a:r>
+          </a:p>
+        </p:txBody>
+      </p:sp>
+      <p:pic>
+        <p:nvPicPr>
+          <p:cNvPr id="8" name="Picture 7">
+            <a:extLst>
+              <a:ext uri="{FF2B5EF4-FFF2-40B4-BE49-F238E27FC236}">
+                <a16:creationId xmlns:a16="http://schemas.microsoft.com/office/drawing/2014/main" id="{C8F66402-EE82-F24D-CB40-C6685A907F55}"/>
+              </a:ext>
+            </a:extLst>
+          </p:cNvPr>
+          <p:cNvPicPr>
+            <a:picLocks noChangeAspect="1"/>
+          </p:cNvPicPr>
+          <p:nvPr/>
+        </p:nvPicPr>
+        <p:blipFill>
+          <a:blip r:embed="rId2"/>
+          <a:stretch>
+            <a:fillRect/>
+          </a:stretch>
+        </p:blipFill>
+        <p:spPr>
+          <a:xfrm>
+            <a:off x="1829554" y="0"/>
+            <a:ext cx="8532891" cy="6858000"/>
+          </a:xfrm>
+          <a:prstGeom prst="rect">
+            <a:avLst/>
+          </a:prstGeom>
+        </p:spPr>
+      </p:pic>
     </p:spTree>
     <p:extLst>
       <p:ext uri="{BB962C8B-B14F-4D97-AF65-F5344CB8AC3E}">
-        <p14:creationId xmlns:p14="http://schemas.microsoft.com/office/powerpoint/2010/main" val="4208127805"/>
+        <p14:creationId xmlns:p14="http://schemas.microsoft.com/office/powerpoint/2010/main" val="3160549705"/>
       </p:ext>
     </p:extLst>
   </p:cSld>

</xml_diff>